<commit_message>
fix: some images missing for newer languages
</commit_message>
<xml_diff>
--- a/exercises/Introduction-To-Exercises.pptx
+++ b/exercises/Introduction-To-Exercises.pptx
@@ -18,6 +18,7 @@
     <p:sldId id="263" r:id="rId12"/>
     <p:sldId id="264" r:id="rId13"/>
     <p:sldId id="269" r:id="rId14"/>
+    <p:sldId id="270" r:id="rId15"/>
   </p:sldIdLst>
   <p:sldSz cx="12192000" cy="6858000"/>
   <p:notesSz cx="6858000" cy="9144000"/>
@@ -273,7 +274,7 @@
           <a:p>
             <a:fld id="{7050BE90-09FA-544D-8D3A-FA7381762E43}" type="datetimeFigureOut">
               <a:rPr lang="en-US" smtClean="0"/>
-              <a:t>4/19/21</a:t>
+              <a:t>6/9/24</a:t>
             </a:fld>
             <a:endParaRPr lang="en-US"/>
           </a:p>
@@ -473,7 +474,7 @@
           <a:p>
             <a:fld id="{7050BE90-09FA-544D-8D3A-FA7381762E43}" type="datetimeFigureOut">
               <a:rPr lang="en-US" smtClean="0"/>
-              <a:t>4/19/21</a:t>
+              <a:t>6/9/24</a:t>
             </a:fld>
             <a:endParaRPr lang="en-US"/>
           </a:p>
@@ -683,7 +684,7 @@
           <a:p>
             <a:fld id="{7050BE90-09FA-544D-8D3A-FA7381762E43}" type="datetimeFigureOut">
               <a:rPr lang="en-US" smtClean="0"/>
-              <a:t>4/19/21</a:t>
+              <a:t>6/9/24</a:t>
             </a:fld>
             <a:endParaRPr lang="en-US"/>
           </a:p>
@@ -883,7 +884,7 @@
           <a:p>
             <a:fld id="{7050BE90-09FA-544D-8D3A-FA7381762E43}" type="datetimeFigureOut">
               <a:rPr lang="en-US" smtClean="0"/>
-              <a:t>4/19/21</a:t>
+              <a:t>6/9/24</a:t>
             </a:fld>
             <a:endParaRPr lang="en-US"/>
           </a:p>
@@ -1159,7 +1160,7 @@
           <a:p>
             <a:fld id="{7050BE90-09FA-544D-8D3A-FA7381762E43}" type="datetimeFigureOut">
               <a:rPr lang="en-US" smtClean="0"/>
-              <a:t>4/19/21</a:t>
+              <a:t>6/9/24</a:t>
             </a:fld>
             <a:endParaRPr lang="en-US"/>
           </a:p>
@@ -1427,7 +1428,7 @@
           <a:p>
             <a:fld id="{7050BE90-09FA-544D-8D3A-FA7381762E43}" type="datetimeFigureOut">
               <a:rPr lang="en-US" smtClean="0"/>
-              <a:t>4/19/21</a:t>
+              <a:t>6/9/24</a:t>
             </a:fld>
             <a:endParaRPr lang="en-US"/>
           </a:p>
@@ -1842,7 +1843,7 @@
           <a:p>
             <a:fld id="{7050BE90-09FA-544D-8D3A-FA7381762E43}" type="datetimeFigureOut">
               <a:rPr lang="en-US" smtClean="0"/>
-              <a:t>4/19/21</a:t>
+              <a:t>6/9/24</a:t>
             </a:fld>
             <a:endParaRPr lang="en-US"/>
           </a:p>
@@ -1984,7 +1985,7 @@
           <a:p>
             <a:fld id="{7050BE90-09FA-544D-8D3A-FA7381762E43}" type="datetimeFigureOut">
               <a:rPr lang="en-US" smtClean="0"/>
-              <a:t>4/19/21</a:t>
+              <a:t>6/9/24</a:t>
             </a:fld>
             <a:endParaRPr lang="en-US"/>
           </a:p>
@@ -2097,7 +2098,7 @@
           <a:p>
             <a:fld id="{7050BE90-09FA-544D-8D3A-FA7381762E43}" type="datetimeFigureOut">
               <a:rPr lang="en-US" smtClean="0"/>
-              <a:t>4/19/21</a:t>
+              <a:t>6/9/24</a:t>
             </a:fld>
             <a:endParaRPr lang="en-US"/>
           </a:p>
@@ -2410,7 +2411,7 @@
           <a:p>
             <a:fld id="{7050BE90-09FA-544D-8D3A-FA7381762E43}" type="datetimeFigureOut">
               <a:rPr lang="en-US" smtClean="0"/>
-              <a:t>4/19/21</a:t>
+              <a:t>6/9/24</a:t>
             </a:fld>
             <a:endParaRPr lang="en-US"/>
           </a:p>
@@ -2699,7 +2700,7 @@
           <a:p>
             <a:fld id="{7050BE90-09FA-544D-8D3A-FA7381762E43}" type="datetimeFigureOut">
               <a:rPr lang="en-US" smtClean="0"/>
-              <a:t>4/19/21</a:t>
+              <a:t>6/9/24</a:t>
             </a:fld>
             <a:endParaRPr lang="en-US"/>
           </a:p>
@@ -2942,7 +2943,7 @@
           <a:p>
             <a:fld id="{7050BE90-09FA-544D-8D3A-FA7381762E43}" type="datetimeFigureOut">
               <a:rPr lang="en-US" smtClean="0"/>
-              <a:t>4/19/21</a:t>
+              <a:t>6/9/24</a:t>
             </a:fld>
             <a:endParaRPr lang="en-US"/>
           </a:p>
@@ -4340,6 +4341,234 @@
 </p:sld>
 </file>
 
+<file path=ppt/slides/slide14.xml><?xml version="1.0" encoding="utf-8"?>
+<p:sld xmlns:a="http://schemas.openxmlformats.org/drawingml/2006/main" xmlns:r="http://schemas.openxmlformats.org/officeDocument/2006/relationships" xmlns:p="http://schemas.openxmlformats.org/presentationml/2006/main">
+  <p:cSld>
+    <p:spTree>
+      <p:nvGrpSpPr>
+        <p:cNvPr id="1" name=""/>
+        <p:cNvGrpSpPr/>
+        <p:nvPr/>
+      </p:nvGrpSpPr>
+      <p:grpSpPr>
+        <a:xfrm>
+          <a:off x="0" y="0"/>
+          <a:ext cx="0" cy="0"/>
+          <a:chOff x="0" y="0"/>
+          <a:chExt cx="0" cy="0"/>
+        </a:xfrm>
+      </p:grpSpPr>
+      <p:pic>
+        <p:nvPicPr>
+          <p:cNvPr id="3" name="Picture 2" descr="A screenshot of a chat&#10;&#10;Description automatically generated">
+            <a:extLst>
+              <a:ext uri="{FF2B5EF4-FFF2-40B4-BE49-F238E27FC236}">
+                <a16:creationId xmlns:a16="http://schemas.microsoft.com/office/drawing/2014/main" id="{B3B50224-E4C6-57D4-9A44-5444AA9DCC1F}"/>
+              </a:ext>
+            </a:extLst>
+          </p:cNvPr>
+          <p:cNvPicPr>
+            <a:picLocks noChangeAspect="1"/>
+          </p:cNvPicPr>
+          <p:nvPr/>
+        </p:nvPicPr>
+        <p:blipFill>
+          <a:blip r:embed="rId2"/>
+          <a:stretch>
+            <a:fillRect/>
+          </a:stretch>
+        </p:blipFill>
+        <p:spPr>
+          <a:xfrm>
+            <a:off x="966316" y="0"/>
+            <a:ext cx="4772967" cy="6858000"/>
+          </a:xfrm>
+          <a:prstGeom prst="rect">
+            <a:avLst/>
+          </a:prstGeom>
+        </p:spPr>
+      </p:pic>
+      <p:sp>
+        <p:nvSpPr>
+          <p:cNvPr id="4" name="Line Callout 2 3">
+            <a:extLst>
+              <a:ext uri="{FF2B5EF4-FFF2-40B4-BE49-F238E27FC236}">
+                <a16:creationId xmlns:a16="http://schemas.microsoft.com/office/drawing/2014/main" id="{3E0EF88C-E2CA-0DBB-067B-FB63ED3678D0}"/>
+              </a:ext>
+            </a:extLst>
+          </p:cNvPr>
+          <p:cNvSpPr/>
+          <p:nvPr/>
+        </p:nvSpPr>
+        <p:spPr>
+          <a:xfrm>
+            <a:off x="6959182" y="5189313"/>
+            <a:ext cx="1566154" cy="817123"/>
+          </a:xfrm>
+          <a:prstGeom prst="borderCallout2">
+            <a:avLst>
+              <a:gd name="adj1" fmla="val 18750"/>
+              <a:gd name="adj2" fmla="val -8333"/>
+              <a:gd name="adj3" fmla="val 18750"/>
+              <a:gd name="adj4" fmla="val -16667"/>
+              <a:gd name="adj5" fmla="val -28522"/>
+              <a:gd name="adj6" fmla="val -229998"/>
+            </a:avLst>
+          </a:prstGeom>
+        </p:spPr>
+        <p:style>
+          <a:lnRef idx="2">
+            <a:schemeClr val="accent1">
+              <a:shade val="50000"/>
+            </a:schemeClr>
+          </a:lnRef>
+          <a:fillRef idx="1">
+            <a:schemeClr val="accent1"/>
+          </a:fillRef>
+          <a:effectRef idx="0">
+            <a:schemeClr val="accent1"/>
+          </a:effectRef>
+          <a:fontRef idx="minor">
+            <a:schemeClr val="lt1"/>
+          </a:fontRef>
+        </p:style>
+        <p:txBody>
+          <a:bodyPr rtlCol="0" anchor="ctr"/>
+          <a:lstStyle/>
+          <a:p>
+            <a:pPr algn="ctr"/>
+            <a:r>
+              <a:rPr lang="en-US" sz="1200" dirty="0"/>
+              <a:t>We have a simple Messaging Gateway that mediates access to RMQ</a:t>
+            </a:r>
+          </a:p>
+        </p:txBody>
+      </p:sp>
+      <p:sp>
+        <p:nvSpPr>
+          <p:cNvPr id="5" name="Line Callout 2 4">
+            <a:extLst>
+              <a:ext uri="{FF2B5EF4-FFF2-40B4-BE49-F238E27FC236}">
+                <a16:creationId xmlns:a16="http://schemas.microsoft.com/office/drawing/2014/main" id="{185E8DDB-9E8D-251C-7131-E64F1E211EC8}"/>
+              </a:ext>
+            </a:extLst>
+          </p:cNvPr>
+          <p:cNvSpPr/>
+          <p:nvPr/>
+        </p:nvSpPr>
+        <p:spPr>
+          <a:xfrm>
+            <a:off x="6959182" y="266277"/>
+            <a:ext cx="1566154" cy="817123"/>
+          </a:xfrm>
+          <a:prstGeom prst="borderCallout2">
+            <a:avLst>
+              <a:gd name="adj1" fmla="val 18750"/>
+              <a:gd name="adj2" fmla="val -8333"/>
+              <a:gd name="adj3" fmla="val 18750"/>
+              <a:gd name="adj4" fmla="val -16667"/>
+              <a:gd name="adj5" fmla="val 139881"/>
+              <a:gd name="adj6" fmla="val -213127"/>
+            </a:avLst>
+          </a:prstGeom>
+        </p:spPr>
+        <p:style>
+          <a:lnRef idx="2">
+            <a:schemeClr val="accent1">
+              <a:shade val="50000"/>
+            </a:schemeClr>
+          </a:lnRef>
+          <a:fillRef idx="1">
+            <a:schemeClr val="accent1"/>
+          </a:fillRef>
+          <a:effectRef idx="0">
+            <a:schemeClr val="accent1"/>
+          </a:effectRef>
+          <a:fontRef idx="minor">
+            <a:schemeClr val="lt1"/>
+          </a:fontRef>
+        </p:style>
+        <p:txBody>
+          <a:bodyPr rtlCol="0" anchor="ctr"/>
+          <a:lstStyle/>
+          <a:p>
+            <a:pPr algn="ctr"/>
+            <a:r>
+              <a:rPr lang="en-US" sz="1200" dirty="0"/>
+              <a:t>A simple console application for receiving a message</a:t>
+            </a:r>
+          </a:p>
+        </p:txBody>
+      </p:sp>
+      <p:sp>
+        <p:nvSpPr>
+          <p:cNvPr id="6" name="Line Callout 2 5">
+            <a:extLst>
+              <a:ext uri="{FF2B5EF4-FFF2-40B4-BE49-F238E27FC236}">
+                <a16:creationId xmlns:a16="http://schemas.microsoft.com/office/drawing/2014/main" id="{892DC721-E657-8FA4-3FC5-BF40CF6A4485}"/>
+              </a:ext>
+            </a:extLst>
+          </p:cNvPr>
+          <p:cNvSpPr/>
+          <p:nvPr/>
+        </p:nvSpPr>
+        <p:spPr>
+          <a:xfrm>
+            <a:off x="6959182" y="3261267"/>
+            <a:ext cx="1566154" cy="817123"/>
+          </a:xfrm>
+          <a:prstGeom prst="borderCallout2">
+            <a:avLst>
+              <a:gd name="adj1" fmla="val 3274"/>
+              <a:gd name="adj2" fmla="val 1605"/>
+              <a:gd name="adj3" fmla="val -5059"/>
+              <a:gd name="adj4" fmla="val -12319"/>
+              <a:gd name="adj5" fmla="val 26529"/>
+              <a:gd name="adj6" fmla="val -249554"/>
+            </a:avLst>
+          </a:prstGeom>
+        </p:spPr>
+        <p:style>
+          <a:lnRef idx="2">
+            <a:schemeClr val="accent1">
+              <a:shade val="50000"/>
+            </a:schemeClr>
+          </a:lnRef>
+          <a:fillRef idx="1">
+            <a:schemeClr val="accent1"/>
+          </a:fillRef>
+          <a:effectRef idx="0">
+            <a:schemeClr val="accent1"/>
+          </a:effectRef>
+          <a:fontRef idx="minor">
+            <a:schemeClr val="lt1"/>
+          </a:fontRef>
+        </p:style>
+        <p:txBody>
+          <a:bodyPr rtlCol="0" anchor="ctr"/>
+          <a:lstStyle/>
+          <a:p>
+            <a:pPr algn="ctr"/>
+            <a:r>
+              <a:rPr lang="en-US" sz="1200" dirty="0"/>
+              <a:t>A simple console application for sending a message</a:t>
+            </a:r>
+          </a:p>
+        </p:txBody>
+      </p:sp>
+    </p:spTree>
+    <p:extLst>
+      <p:ext uri="{BB962C8B-B14F-4D97-AF65-F5344CB8AC3E}">
+        <p14:creationId xmlns:p14="http://schemas.microsoft.com/office/powerpoint/2010/main" val="1858405991"/>
+      </p:ext>
+    </p:extLst>
+  </p:cSld>
+  <p:clrMapOvr>
+    <a:masterClrMapping/>
+  </p:clrMapOvr>
+</p:sld>
+</file>
+
 <file path=ppt/slides/slide2.xml><?xml version="1.0" encoding="utf-8"?>
 <p:sld xmlns:a="http://schemas.openxmlformats.org/drawingml/2006/main" xmlns:r="http://schemas.openxmlformats.org/officeDocument/2006/relationships" xmlns:p="http://schemas.openxmlformats.org/presentationml/2006/main">
   <p:cSld>
@@ -5292,14 +5521,14 @@
           <a:p>
             <a:r>
               <a:rPr lang="en-US" dirty="0"/>
-              <a:t>The Exercises come in three languages:</a:t>
+              <a:t>The Exercises come in five languages:</a:t>
             </a:r>
           </a:p>
           <a:p>
             <a:pPr lvl="1"/>
             <a:r>
               <a:rPr lang="en-US" dirty="0"/>
-              <a:t>C#, Python, JavaScript</a:t>
+              <a:t>C#, Go, Java, JavaScript and Python</a:t>
             </a:r>
           </a:p>
           <a:p>

</xml_diff>

<commit_message>
fix: slide changes; missing mp4
</commit_message>
<xml_diff>
--- a/exercises/Introduction-To-Exercises.pptx
+++ b/exercises/Introduction-To-Exercises.pptx
@@ -274,7 +274,7 @@
           <a:p>
             <a:fld id="{7050BE90-09FA-544D-8D3A-FA7381762E43}" type="datetimeFigureOut">
               <a:rPr lang="en-US" smtClean="0"/>
-              <a:t>6/9/24</a:t>
+              <a:t>6/10/24</a:t>
             </a:fld>
             <a:endParaRPr lang="en-US"/>
           </a:p>
@@ -474,7 +474,7 @@
           <a:p>
             <a:fld id="{7050BE90-09FA-544D-8D3A-FA7381762E43}" type="datetimeFigureOut">
               <a:rPr lang="en-US" smtClean="0"/>
-              <a:t>6/9/24</a:t>
+              <a:t>6/10/24</a:t>
             </a:fld>
             <a:endParaRPr lang="en-US"/>
           </a:p>
@@ -684,7 +684,7 @@
           <a:p>
             <a:fld id="{7050BE90-09FA-544D-8D3A-FA7381762E43}" type="datetimeFigureOut">
               <a:rPr lang="en-US" smtClean="0"/>
-              <a:t>6/9/24</a:t>
+              <a:t>6/10/24</a:t>
             </a:fld>
             <a:endParaRPr lang="en-US"/>
           </a:p>
@@ -884,7 +884,7 @@
           <a:p>
             <a:fld id="{7050BE90-09FA-544D-8D3A-FA7381762E43}" type="datetimeFigureOut">
               <a:rPr lang="en-US" smtClean="0"/>
-              <a:t>6/9/24</a:t>
+              <a:t>6/10/24</a:t>
             </a:fld>
             <a:endParaRPr lang="en-US"/>
           </a:p>
@@ -1160,7 +1160,7 @@
           <a:p>
             <a:fld id="{7050BE90-09FA-544D-8D3A-FA7381762E43}" type="datetimeFigureOut">
               <a:rPr lang="en-US" smtClean="0"/>
-              <a:t>6/9/24</a:t>
+              <a:t>6/10/24</a:t>
             </a:fld>
             <a:endParaRPr lang="en-US"/>
           </a:p>
@@ -1428,7 +1428,7 @@
           <a:p>
             <a:fld id="{7050BE90-09FA-544D-8D3A-FA7381762E43}" type="datetimeFigureOut">
               <a:rPr lang="en-US" smtClean="0"/>
-              <a:t>6/9/24</a:t>
+              <a:t>6/10/24</a:t>
             </a:fld>
             <a:endParaRPr lang="en-US"/>
           </a:p>
@@ -1843,7 +1843,7 @@
           <a:p>
             <a:fld id="{7050BE90-09FA-544D-8D3A-FA7381762E43}" type="datetimeFigureOut">
               <a:rPr lang="en-US" smtClean="0"/>
-              <a:t>6/9/24</a:t>
+              <a:t>6/10/24</a:t>
             </a:fld>
             <a:endParaRPr lang="en-US"/>
           </a:p>
@@ -1985,7 +1985,7 @@
           <a:p>
             <a:fld id="{7050BE90-09FA-544D-8D3A-FA7381762E43}" type="datetimeFigureOut">
               <a:rPr lang="en-US" smtClean="0"/>
-              <a:t>6/9/24</a:t>
+              <a:t>6/10/24</a:t>
             </a:fld>
             <a:endParaRPr lang="en-US"/>
           </a:p>
@@ -2098,7 +2098,7 @@
           <a:p>
             <a:fld id="{7050BE90-09FA-544D-8D3A-FA7381762E43}" type="datetimeFigureOut">
               <a:rPr lang="en-US" smtClean="0"/>
-              <a:t>6/9/24</a:t>
+              <a:t>6/10/24</a:t>
             </a:fld>
             <a:endParaRPr lang="en-US"/>
           </a:p>
@@ -2411,7 +2411,7 @@
           <a:p>
             <a:fld id="{7050BE90-09FA-544D-8D3A-FA7381762E43}" type="datetimeFigureOut">
               <a:rPr lang="en-US" smtClean="0"/>
-              <a:t>6/9/24</a:t>
+              <a:t>6/10/24</a:t>
             </a:fld>
             <a:endParaRPr lang="en-US"/>
           </a:p>
@@ -2700,7 +2700,7 @@
           <a:p>
             <a:fld id="{7050BE90-09FA-544D-8D3A-FA7381762E43}" type="datetimeFigureOut">
               <a:rPr lang="en-US" smtClean="0"/>
-              <a:t>6/9/24</a:t>
+              <a:t>6/10/24</a:t>
             </a:fld>
             <a:endParaRPr lang="en-US"/>
           </a:p>
@@ -2943,7 +2943,7 @@
           <a:p>
             <a:fld id="{7050BE90-09FA-544D-8D3A-FA7381762E43}" type="datetimeFigureOut">
               <a:rPr lang="en-US" smtClean="0"/>
-              <a:t>6/9/24</a:t>
+              <a:t>6/10/24</a:t>
             </a:fld>
             <a:endParaRPr lang="en-US"/>
           </a:p>
@@ -4692,7 +4692,7 @@
             </a:r>
             <a:r>
               <a:rPr lang="en-US" i="1" dirty="0"/>
-              <a:t>docker-compose up –d</a:t>
+              <a:t>docker compose up –d</a:t>
             </a:r>
           </a:p>
           <a:p>
@@ -4974,8 +4974,13 @@
             <a:pPr lvl="1"/>
             <a:r>
               <a:rPr lang="en-US" dirty="0"/>
-              <a:t>They have supporting, short videos in Dropbox.</a:t>
-            </a:r>
+              <a:t>They have supporting, short videos </a:t>
+            </a:r>
+            <a:r>
+              <a:rPr lang="en-US"/>
+              <a:t>in GitHub.</a:t>
+            </a:r>
+            <a:endParaRPr lang="en-US" dirty="0"/>
           </a:p>
           <a:p>
             <a:pPr lvl="1"/>

</xml_diff>

<commit_message>
fix: improve the versioning slides
</commit_message>
<xml_diff>
--- a/exercises/Introduction-To-Exercises.pptx
+++ b/exercises/Introduction-To-Exercises.pptx
@@ -274,7 +274,7 @@
           <a:p>
             <a:fld id="{7050BE90-09FA-544D-8D3A-FA7381762E43}" type="datetimeFigureOut">
               <a:rPr lang="en-US" smtClean="0"/>
-              <a:t>6/10/24</a:t>
+              <a:t>9/30/24</a:t>
             </a:fld>
             <a:endParaRPr lang="en-US"/>
           </a:p>
@@ -474,7 +474,7 @@
           <a:p>
             <a:fld id="{7050BE90-09FA-544D-8D3A-FA7381762E43}" type="datetimeFigureOut">
               <a:rPr lang="en-US" smtClean="0"/>
-              <a:t>6/10/24</a:t>
+              <a:t>9/30/24</a:t>
             </a:fld>
             <a:endParaRPr lang="en-US"/>
           </a:p>
@@ -684,7 +684,7 @@
           <a:p>
             <a:fld id="{7050BE90-09FA-544D-8D3A-FA7381762E43}" type="datetimeFigureOut">
               <a:rPr lang="en-US" smtClean="0"/>
-              <a:t>6/10/24</a:t>
+              <a:t>9/30/24</a:t>
             </a:fld>
             <a:endParaRPr lang="en-US"/>
           </a:p>
@@ -884,7 +884,7 @@
           <a:p>
             <a:fld id="{7050BE90-09FA-544D-8D3A-FA7381762E43}" type="datetimeFigureOut">
               <a:rPr lang="en-US" smtClean="0"/>
-              <a:t>6/10/24</a:t>
+              <a:t>9/30/24</a:t>
             </a:fld>
             <a:endParaRPr lang="en-US"/>
           </a:p>
@@ -1160,7 +1160,7 @@
           <a:p>
             <a:fld id="{7050BE90-09FA-544D-8D3A-FA7381762E43}" type="datetimeFigureOut">
               <a:rPr lang="en-US" smtClean="0"/>
-              <a:t>6/10/24</a:t>
+              <a:t>9/30/24</a:t>
             </a:fld>
             <a:endParaRPr lang="en-US"/>
           </a:p>
@@ -1428,7 +1428,7 @@
           <a:p>
             <a:fld id="{7050BE90-09FA-544D-8D3A-FA7381762E43}" type="datetimeFigureOut">
               <a:rPr lang="en-US" smtClean="0"/>
-              <a:t>6/10/24</a:t>
+              <a:t>9/30/24</a:t>
             </a:fld>
             <a:endParaRPr lang="en-US"/>
           </a:p>
@@ -1843,7 +1843,7 @@
           <a:p>
             <a:fld id="{7050BE90-09FA-544D-8D3A-FA7381762E43}" type="datetimeFigureOut">
               <a:rPr lang="en-US" smtClean="0"/>
-              <a:t>6/10/24</a:t>
+              <a:t>9/30/24</a:t>
             </a:fld>
             <a:endParaRPr lang="en-US"/>
           </a:p>
@@ -1985,7 +1985,7 @@
           <a:p>
             <a:fld id="{7050BE90-09FA-544D-8D3A-FA7381762E43}" type="datetimeFigureOut">
               <a:rPr lang="en-US" smtClean="0"/>
-              <a:t>6/10/24</a:t>
+              <a:t>9/30/24</a:t>
             </a:fld>
             <a:endParaRPr lang="en-US"/>
           </a:p>
@@ -2098,7 +2098,7 @@
           <a:p>
             <a:fld id="{7050BE90-09FA-544D-8D3A-FA7381762E43}" type="datetimeFigureOut">
               <a:rPr lang="en-US" smtClean="0"/>
-              <a:t>6/10/24</a:t>
+              <a:t>9/30/24</a:t>
             </a:fld>
             <a:endParaRPr lang="en-US"/>
           </a:p>
@@ -2411,7 +2411,7 @@
           <a:p>
             <a:fld id="{7050BE90-09FA-544D-8D3A-FA7381762E43}" type="datetimeFigureOut">
               <a:rPr lang="en-US" smtClean="0"/>
-              <a:t>6/10/24</a:t>
+              <a:t>9/30/24</a:t>
             </a:fld>
             <a:endParaRPr lang="en-US"/>
           </a:p>
@@ -2700,7 +2700,7 @@
           <a:p>
             <a:fld id="{7050BE90-09FA-544D-8D3A-FA7381762E43}" type="datetimeFigureOut">
               <a:rPr lang="en-US" smtClean="0"/>
-              <a:t>6/10/24</a:t>
+              <a:t>9/30/24</a:t>
             </a:fld>
             <a:endParaRPr lang="en-US"/>
           </a:p>
@@ -2943,7 +2943,7 @@
           <a:p>
             <a:fld id="{7050BE90-09FA-544D-8D3A-FA7381762E43}" type="datetimeFigureOut">
               <a:rPr lang="en-US" smtClean="0"/>
-              <a:t>6/10/24</a:t>
+              <a:t>9/30/24</a:t>
             </a:fld>
             <a:endParaRPr lang="en-US"/>
           </a:p>

</xml_diff>